<commit_message>
edited PwP and requirements.txt added
</commit_message>
<xml_diff>
--- a/Ученический электронный дневник.pptx
+++ b/Ученический электронный дневник.pptx
@@ -9,10 +9,12 @@
     <p:sldId id="256" r:id="rId3"/>
     <p:sldId id="257" r:id="rId4"/>
     <p:sldId id="258" r:id="rId5"/>
-    <p:sldId id="259" r:id="rId6"/>
+    <p:sldId id="276" r:id="rId6"/>
     <p:sldId id="260" r:id="rId7"/>
     <p:sldId id="261" r:id="rId8"/>
-    <p:sldId id="273" r:id="rId9"/>
+    <p:sldId id="274" r:id="rId9"/>
+    <p:sldId id="275" r:id="rId10"/>
+    <p:sldId id="273" r:id="rId11"/>
   </p:sldIdLst>
   <p:sldSz cx="12192000" cy="6858000"/>
   <p:notesSz cx="6858000" cy="9144000"/>
@@ -119,9 +121,11 @@
             <p14:sldId id="256"/>
             <p14:sldId id="257"/>
             <p14:sldId id="258"/>
-            <p14:sldId id="259"/>
+            <p14:sldId id="276"/>
             <p14:sldId id="260"/>
             <p14:sldId id="261"/>
+            <p14:sldId id="274"/>
+            <p14:sldId id="275"/>
             <p14:sldId id="273"/>
           </p14:sldIdLst>
         </p14:section>
@@ -281,7 +285,7 @@
           <a:p>
             <a:fld id="{9A376EF8-BAF3-40CA-9B57-189CB9EE4886}" type="datetimeFigureOut">
               <a:rPr lang="ru-RU" smtClean="0"/>
-              <a:t>16.04.2024</a:t>
+              <a:t>23.04.2024</a:t>
             </a:fld>
             <a:endParaRPr lang="ru-RU"/>
           </a:p>
@@ -479,7 +483,7 @@
           <a:p>
             <a:fld id="{9A376EF8-BAF3-40CA-9B57-189CB9EE4886}" type="datetimeFigureOut">
               <a:rPr lang="ru-RU" smtClean="0"/>
-              <a:t>16.04.2024</a:t>
+              <a:t>23.04.2024</a:t>
             </a:fld>
             <a:endParaRPr lang="ru-RU"/>
           </a:p>
@@ -687,7 +691,7 @@
           <a:p>
             <a:fld id="{9A376EF8-BAF3-40CA-9B57-189CB9EE4886}" type="datetimeFigureOut">
               <a:rPr lang="ru-RU" smtClean="0"/>
-              <a:t>16.04.2024</a:t>
+              <a:t>23.04.2024</a:t>
             </a:fld>
             <a:endParaRPr lang="ru-RU"/>
           </a:p>
@@ -1482,7 +1486,7 @@
           <a:p>
             <a:fld id="{9A376EF8-BAF3-40CA-9B57-189CB9EE4886}" type="datetimeFigureOut">
               <a:rPr lang="ru-RU" smtClean="0"/>
-              <a:t>16.04.2024</a:t>
+              <a:t>23.04.2024</a:t>
             </a:fld>
             <a:endParaRPr lang="ru-RU"/>
           </a:p>
@@ -1658,7 +1662,7 @@
           <a:p>
             <a:fld id="{9A376EF8-BAF3-40CA-9B57-189CB9EE4886}" type="datetimeFigureOut">
               <a:rPr lang="ru-RU" smtClean="0"/>
-              <a:t>16.04.2024</a:t>
+              <a:t>23.04.2024</a:t>
             </a:fld>
             <a:endParaRPr lang="ru-RU"/>
           </a:p>
@@ -1905,7 +1909,7 @@
           <a:p>
             <a:fld id="{9A376EF8-BAF3-40CA-9B57-189CB9EE4886}" type="datetimeFigureOut">
               <a:rPr lang="ru-RU" smtClean="0"/>
-              <a:t>16.04.2024</a:t>
+              <a:t>23.04.2024</a:t>
             </a:fld>
             <a:endParaRPr lang="ru-RU"/>
           </a:p>
@@ -2137,7 +2141,7 @@
           <a:p>
             <a:fld id="{9A376EF8-BAF3-40CA-9B57-189CB9EE4886}" type="datetimeFigureOut">
               <a:rPr lang="ru-RU" smtClean="0"/>
-              <a:t>16.04.2024</a:t>
+              <a:t>23.04.2024</a:t>
             </a:fld>
             <a:endParaRPr lang="ru-RU"/>
           </a:p>
@@ -2511,7 +2515,7 @@
           <a:p>
             <a:fld id="{9A376EF8-BAF3-40CA-9B57-189CB9EE4886}" type="datetimeFigureOut">
               <a:rPr lang="ru-RU" smtClean="0"/>
-              <a:t>16.04.2024</a:t>
+              <a:t>23.04.2024</a:t>
             </a:fld>
             <a:endParaRPr lang="ru-RU"/>
           </a:p>
@@ -2634,7 +2638,7 @@
           <a:p>
             <a:fld id="{9A376EF8-BAF3-40CA-9B57-189CB9EE4886}" type="datetimeFigureOut">
               <a:rPr lang="ru-RU" smtClean="0"/>
-              <a:t>16.04.2024</a:t>
+              <a:t>23.04.2024</a:t>
             </a:fld>
             <a:endParaRPr lang="ru-RU"/>
           </a:p>
@@ -2729,7 +2733,7 @@
           <a:p>
             <a:fld id="{9A376EF8-BAF3-40CA-9B57-189CB9EE4886}" type="datetimeFigureOut">
               <a:rPr lang="ru-RU" smtClean="0"/>
-              <a:t>16.04.2024</a:t>
+              <a:t>23.04.2024</a:t>
             </a:fld>
             <a:endParaRPr lang="ru-RU"/>
           </a:p>
@@ -2984,7 +2988,7 @@
           <a:p>
             <a:fld id="{9A376EF8-BAF3-40CA-9B57-189CB9EE4886}" type="datetimeFigureOut">
               <a:rPr lang="ru-RU" smtClean="0"/>
-              <a:t>16.04.2024</a:t>
+              <a:t>23.04.2024</a:t>
             </a:fld>
             <a:endParaRPr lang="ru-RU"/>
           </a:p>
@@ -3170,7 +3174,7 @@
           <a:p>
             <a:fld id="{9A376EF8-BAF3-40CA-9B57-189CB9EE4886}" type="datetimeFigureOut">
               <a:rPr lang="ru-RU" smtClean="0"/>
-              <a:t>16.04.2024</a:t>
+              <a:t>23.04.2024</a:t>
             </a:fld>
             <a:endParaRPr lang="ru-RU"/>
           </a:p>
@@ -3445,7 +3449,7 @@
           <a:p>
             <a:fld id="{9A376EF8-BAF3-40CA-9B57-189CB9EE4886}" type="datetimeFigureOut">
               <a:rPr lang="ru-RU" smtClean="0"/>
-              <a:t>16.04.2024</a:t>
+              <a:t>23.04.2024</a:t>
             </a:fld>
             <a:endParaRPr lang="ru-RU"/>
           </a:p>
@@ -3696,7 +3700,7 @@
           <a:p>
             <a:fld id="{9A376EF8-BAF3-40CA-9B57-189CB9EE4886}" type="datetimeFigureOut">
               <a:rPr lang="ru-RU" smtClean="0"/>
-              <a:t>16.04.2024</a:t>
+              <a:t>23.04.2024</a:t>
             </a:fld>
             <a:endParaRPr lang="ru-RU"/>
           </a:p>
@@ -4010,7 +4014,7 @@
           <a:p>
             <a:fld id="{9A376EF8-BAF3-40CA-9B57-189CB9EE4886}" type="datetimeFigureOut">
               <a:rPr lang="ru-RU" smtClean="0"/>
-              <a:t>16.04.2024</a:t>
+              <a:t>23.04.2024</a:t>
             </a:fld>
             <a:endParaRPr lang="ru-RU"/>
           </a:p>
@@ -4351,7 +4355,7 @@
           <a:p>
             <a:fld id="{9A376EF8-BAF3-40CA-9B57-189CB9EE4886}" type="datetimeFigureOut">
               <a:rPr lang="ru-RU" smtClean="0"/>
-              <a:t>16.04.2024</a:t>
+              <a:t>23.04.2024</a:t>
             </a:fld>
             <a:endParaRPr lang="ru-RU"/>
           </a:p>
@@ -4665,7 +4669,7 @@
           <a:p>
             <a:fld id="{9A376EF8-BAF3-40CA-9B57-189CB9EE4886}" type="datetimeFigureOut">
               <a:rPr lang="ru-RU" smtClean="0"/>
-              <a:t>16.04.2024</a:t>
+              <a:t>23.04.2024</a:t>
             </a:fld>
             <a:endParaRPr lang="ru-RU"/>
           </a:p>
@@ -5058,7 +5062,7 @@
           <a:p>
             <a:fld id="{9A376EF8-BAF3-40CA-9B57-189CB9EE4886}" type="datetimeFigureOut">
               <a:rPr lang="ru-RU" smtClean="0"/>
-              <a:t>16.04.2024</a:t>
+              <a:t>23.04.2024</a:t>
             </a:fld>
             <a:endParaRPr lang="ru-RU"/>
           </a:p>
@@ -5228,7 +5232,7 @@
           <a:p>
             <a:fld id="{9A376EF8-BAF3-40CA-9B57-189CB9EE4886}" type="datetimeFigureOut">
               <a:rPr lang="ru-RU" smtClean="0"/>
-              <a:t>16.04.2024</a:t>
+              <a:t>23.04.2024</a:t>
             </a:fld>
             <a:endParaRPr lang="ru-RU"/>
           </a:p>
@@ -5408,7 +5412,7 @@
           <a:p>
             <a:fld id="{9A376EF8-BAF3-40CA-9B57-189CB9EE4886}" type="datetimeFigureOut">
               <a:rPr lang="ru-RU" smtClean="0"/>
-              <a:t>16.04.2024</a:t>
+              <a:t>23.04.2024</a:t>
             </a:fld>
             <a:endParaRPr lang="ru-RU"/>
           </a:p>
@@ -5671,7 +5675,7 @@
           <a:p>
             <a:fld id="{9A376EF8-BAF3-40CA-9B57-189CB9EE4886}" type="datetimeFigureOut">
               <a:rPr lang="ru-RU" smtClean="0"/>
-              <a:t>16.04.2024</a:t>
+              <a:t>23.04.2024</a:t>
             </a:fld>
             <a:endParaRPr lang="ru-RU"/>
           </a:p>
@@ -5936,7 +5940,7 @@
           <a:p>
             <a:fld id="{9A376EF8-BAF3-40CA-9B57-189CB9EE4886}" type="datetimeFigureOut">
               <a:rPr lang="ru-RU" smtClean="0"/>
-              <a:t>16.04.2024</a:t>
+              <a:t>23.04.2024</a:t>
             </a:fld>
             <a:endParaRPr lang="ru-RU"/>
           </a:p>
@@ -6348,7 +6352,7 @@
           <a:p>
             <a:fld id="{9A376EF8-BAF3-40CA-9B57-189CB9EE4886}" type="datetimeFigureOut">
               <a:rPr lang="ru-RU" smtClean="0"/>
-              <a:t>16.04.2024</a:t>
+              <a:t>23.04.2024</a:t>
             </a:fld>
             <a:endParaRPr lang="ru-RU"/>
           </a:p>
@@ -6489,7 +6493,7 @@
           <a:p>
             <a:fld id="{9A376EF8-BAF3-40CA-9B57-189CB9EE4886}" type="datetimeFigureOut">
               <a:rPr lang="ru-RU" smtClean="0"/>
-              <a:t>16.04.2024</a:t>
+              <a:t>23.04.2024</a:t>
             </a:fld>
             <a:endParaRPr lang="ru-RU"/>
           </a:p>
@@ -6602,7 +6606,7 @@
           <a:p>
             <a:fld id="{9A376EF8-BAF3-40CA-9B57-189CB9EE4886}" type="datetimeFigureOut">
               <a:rPr lang="ru-RU" smtClean="0"/>
-              <a:t>16.04.2024</a:t>
+              <a:t>23.04.2024</a:t>
             </a:fld>
             <a:endParaRPr lang="ru-RU"/>
           </a:p>
@@ -6913,7 +6917,7 @@
           <a:p>
             <a:fld id="{9A376EF8-BAF3-40CA-9B57-189CB9EE4886}" type="datetimeFigureOut">
               <a:rPr lang="ru-RU" smtClean="0"/>
-              <a:t>16.04.2024</a:t>
+              <a:t>23.04.2024</a:t>
             </a:fld>
             <a:endParaRPr lang="ru-RU"/>
           </a:p>
@@ -7201,7 +7205,7 @@
           <a:p>
             <a:fld id="{9A376EF8-BAF3-40CA-9B57-189CB9EE4886}" type="datetimeFigureOut">
               <a:rPr lang="ru-RU" smtClean="0"/>
-              <a:t>16.04.2024</a:t>
+              <a:t>23.04.2024</a:t>
             </a:fld>
             <a:endParaRPr lang="ru-RU"/>
           </a:p>
@@ -7442,7 +7446,7 @@
           <a:p>
             <a:fld id="{9A376EF8-BAF3-40CA-9B57-189CB9EE4886}" type="datetimeFigureOut">
               <a:rPr lang="ru-RU" smtClean="0"/>
-              <a:t>16.04.2024</a:t>
+              <a:t>23.04.2024</a:t>
             </a:fld>
             <a:endParaRPr lang="ru-RU"/>
           </a:p>
@@ -8524,7 +8528,7 @@
           <a:p>
             <a:fld id="{9A376EF8-BAF3-40CA-9B57-189CB9EE4886}" type="datetimeFigureOut">
               <a:rPr lang="ru-RU" smtClean="0"/>
-              <a:t>16.04.2024</a:t>
+              <a:t>23.04.2024</a:t>
             </a:fld>
             <a:endParaRPr lang="ru-RU"/>
           </a:p>
@@ -9846,7 +9850,7 @@
           <p:cNvPr id="2" name="Заголовок 1">
             <a:extLst>
               <a:ext uri="{FF2B5EF4-FFF2-40B4-BE49-F238E27FC236}">
-                <a16:creationId xmlns:a16="http://schemas.microsoft.com/office/drawing/2014/main" id="{515F5E9A-E5F7-AD5D-18C4-C86BCE4063F9}"/>
+                <a16:creationId xmlns:a16="http://schemas.microsoft.com/office/drawing/2014/main" id="{F1E5EB16-548F-88AA-ADCD-6D9FD1C2A645}"/>
               </a:ext>
             </a:extLst>
           </p:cNvPr>
@@ -9864,15 +9868,49 @@
           <a:p>
             <a:r>
               <a:rPr lang="ru-RU" dirty="0"/>
-              <a:t>Устройство кода</a:t>
-            </a:r>
-          </a:p>
-        </p:txBody>
-      </p:sp>
+              <a:t>Файловое устройство приложения</a:t>
+            </a:r>
+            <a:br>
+              <a:rPr lang="ru-RU" dirty="0"/>
+            </a:br>
+            <a:endParaRPr lang="ru-RU" dirty="0"/>
+          </a:p>
+        </p:txBody>
+      </p:sp>
+      <p:pic>
+        <p:nvPicPr>
+          <p:cNvPr id="5" name="Рисунок 4">
+            <a:extLst>
+              <a:ext uri="{FF2B5EF4-FFF2-40B4-BE49-F238E27FC236}">
+                <a16:creationId xmlns:a16="http://schemas.microsoft.com/office/drawing/2014/main" id="{D6A674D1-34D6-035D-6AD3-3035CC9EECB3}"/>
+              </a:ext>
+            </a:extLst>
+          </p:cNvPr>
+          <p:cNvPicPr>
+            <a:picLocks noChangeAspect="1"/>
+          </p:cNvPicPr>
+          <p:nvPr/>
+        </p:nvPicPr>
+        <p:blipFill>
+          <a:blip r:embed="rId2"/>
+          <a:stretch>
+            <a:fillRect/>
+          </a:stretch>
+        </p:blipFill>
+        <p:spPr>
+          <a:xfrm>
+            <a:off x="4128480" y="1270000"/>
+            <a:ext cx="3466186" cy="5344510"/>
+          </a:xfrm>
+          <a:prstGeom prst="rect">
+            <a:avLst/>
+          </a:prstGeom>
+        </p:spPr>
+      </p:pic>
     </p:spTree>
     <p:extLst>
       <p:ext uri="{BB962C8B-B14F-4D97-AF65-F5344CB8AC3E}">
-        <p14:creationId xmlns:p14="http://schemas.microsoft.com/office/powerpoint/2010/main" val="772678647"/>
+        <p14:creationId xmlns:p14="http://schemas.microsoft.com/office/powerpoint/2010/main" val="222776569"/>
       </p:ext>
     </p:extLst>
   </p:cSld>
@@ -9927,6 +9965,36 @@
           </a:p>
         </p:txBody>
       </p:sp>
+      <p:pic>
+        <p:nvPicPr>
+          <p:cNvPr id="6" name="Рисунок 5">
+            <a:extLst>
+              <a:ext uri="{FF2B5EF4-FFF2-40B4-BE49-F238E27FC236}">
+                <a16:creationId xmlns:a16="http://schemas.microsoft.com/office/drawing/2014/main" id="{EF77AFC3-CBF0-62C5-D0BB-BDD592548B3C}"/>
+              </a:ext>
+            </a:extLst>
+          </p:cNvPr>
+          <p:cNvPicPr>
+            <a:picLocks noChangeAspect="1"/>
+          </p:cNvPicPr>
+          <p:nvPr/>
+        </p:nvPicPr>
+        <p:blipFill>
+          <a:blip r:embed="rId2"/>
+          <a:stretch>
+            <a:fillRect/>
+          </a:stretch>
+        </p:blipFill>
+        <p:spPr>
+          <a:xfrm>
+            <a:off x="3355115" y="1709683"/>
+            <a:ext cx="5481770" cy="4600523"/>
+          </a:xfrm>
+          <a:prstGeom prst="rect">
+            <a:avLst/>
+          </a:prstGeom>
+        </p:spPr>
+      </p:pic>
     </p:spTree>
     <p:extLst>
       <p:ext uri="{BB962C8B-B14F-4D97-AF65-F5344CB8AC3E}">
@@ -9982,11 +10050,41 @@
           <a:p>
             <a:r>
               <a:rPr lang="ru-RU" dirty="0"/>
-              <a:t>Внешний вид сайта</a:t>
-            </a:r>
-          </a:p>
-        </p:txBody>
-      </p:sp>
+              <a:t>Авторизация</a:t>
+            </a:r>
+          </a:p>
+        </p:txBody>
+      </p:sp>
+      <p:pic>
+        <p:nvPicPr>
+          <p:cNvPr id="4" name="Рисунок 3">
+            <a:extLst>
+              <a:ext uri="{FF2B5EF4-FFF2-40B4-BE49-F238E27FC236}">
+                <a16:creationId xmlns:a16="http://schemas.microsoft.com/office/drawing/2014/main" id="{F80A9FF6-3274-11B7-9BEA-8CB1BF62BE35}"/>
+              </a:ext>
+            </a:extLst>
+          </p:cNvPr>
+          <p:cNvPicPr>
+            <a:picLocks noChangeAspect="1"/>
+          </p:cNvPicPr>
+          <p:nvPr/>
+        </p:nvPicPr>
+        <p:blipFill>
+          <a:blip r:embed="rId2"/>
+          <a:stretch>
+            <a:fillRect/>
+          </a:stretch>
+        </p:blipFill>
+        <p:spPr>
+          <a:xfrm>
+            <a:off x="2348245" y="1503330"/>
+            <a:ext cx="7495510" cy="4348916"/>
+          </a:xfrm>
+          <a:prstGeom prst="rect">
+            <a:avLst/>
+          </a:prstGeom>
+        </p:spPr>
+      </p:pic>
     </p:spTree>
     <p:extLst>
       <p:ext uri="{BB962C8B-B14F-4D97-AF65-F5344CB8AC3E}">
@@ -10001,6 +10099,207 @@
 </file>
 
 <file path=ppt/slides/slide7.xml><?xml version="1.0" encoding="utf-8"?>
+<p:sld xmlns:a="http://schemas.openxmlformats.org/drawingml/2006/main" xmlns:r="http://schemas.openxmlformats.org/officeDocument/2006/relationships" xmlns:p="http://schemas.openxmlformats.org/presentationml/2006/main">
+  <p:cSld>
+    <p:spTree>
+      <p:nvGrpSpPr>
+        <p:cNvPr id="1" name=""/>
+        <p:cNvGrpSpPr/>
+        <p:nvPr/>
+      </p:nvGrpSpPr>
+      <p:grpSpPr>
+        <a:xfrm>
+          <a:off x="0" y="0"/>
+          <a:ext cx="0" cy="0"/>
+          <a:chOff x="0" y="0"/>
+          <a:chExt cx="0" cy="0"/>
+        </a:xfrm>
+      </p:grpSpPr>
+      <p:sp>
+        <p:nvSpPr>
+          <p:cNvPr id="2" name="Заголовок 1">
+            <a:extLst>
+              <a:ext uri="{FF2B5EF4-FFF2-40B4-BE49-F238E27FC236}">
+                <a16:creationId xmlns:a16="http://schemas.microsoft.com/office/drawing/2014/main" id="{E4C33514-A1A5-0C7F-B2AF-48518D140416}"/>
+              </a:ext>
+            </a:extLst>
+          </p:cNvPr>
+          <p:cNvSpPr>
+            <a:spLocks noGrp="1"/>
+          </p:cNvSpPr>
+          <p:nvPr>
+            <p:ph type="title"/>
+          </p:nvPr>
+        </p:nvSpPr>
+        <p:spPr/>
+        <p:txBody>
+          <a:bodyPr/>
+          <a:lstStyle/>
+          <a:p>
+            <a:r>
+              <a:rPr lang="ru-RU" dirty="0"/>
+              <a:t>Основная страница</a:t>
+            </a:r>
+          </a:p>
+        </p:txBody>
+      </p:sp>
+      <p:pic>
+        <p:nvPicPr>
+          <p:cNvPr id="5" name="Рисунок 4">
+            <a:extLst>
+              <a:ext uri="{FF2B5EF4-FFF2-40B4-BE49-F238E27FC236}">
+                <a16:creationId xmlns:a16="http://schemas.microsoft.com/office/drawing/2014/main" id="{A4C27CDB-8F79-79E8-EC7F-ABC7BA158DE8}"/>
+              </a:ext>
+            </a:extLst>
+          </p:cNvPr>
+          <p:cNvPicPr>
+            <a:picLocks noChangeAspect="1"/>
+          </p:cNvPicPr>
+          <p:nvPr/>
+        </p:nvPicPr>
+        <p:blipFill>
+          <a:blip r:embed="rId2"/>
+          <a:stretch>
+            <a:fillRect/>
+          </a:stretch>
+        </p:blipFill>
+        <p:spPr>
+          <a:xfrm>
+            <a:off x="2266590" y="1830902"/>
+            <a:ext cx="7658820" cy="4417498"/>
+          </a:xfrm>
+          <a:prstGeom prst="rect">
+            <a:avLst/>
+          </a:prstGeom>
+        </p:spPr>
+      </p:pic>
+    </p:spTree>
+    <p:extLst>
+      <p:ext uri="{BB962C8B-B14F-4D97-AF65-F5344CB8AC3E}">
+        <p14:creationId xmlns:p14="http://schemas.microsoft.com/office/powerpoint/2010/main" val="3664136431"/>
+      </p:ext>
+    </p:extLst>
+  </p:cSld>
+  <p:clrMapOvr>
+    <a:masterClrMapping/>
+  </p:clrMapOvr>
+</p:sld>
+</file>
+
+<file path=ppt/slides/slide8.xml><?xml version="1.0" encoding="utf-8"?>
+<p:sld xmlns:a="http://schemas.openxmlformats.org/drawingml/2006/main" xmlns:r="http://schemas.openxmlformats.org/officeDocument/2006/relationships" xmlns:p="http://schemas.openxmlformats.org/presentationml/2006/main">
+  <p:cSld>
+    <p:spTree>
+      <p:nvGrpSpPr>
+        <p:cNvPr id="1" name=""/>
+        <p:cNvGrpSpPr/>
+        <p:nvPr/>
+      </p:nvGrpSpPr>
+      <p:grpSpPr>
+        <a:xfrm>
+          <a:off x="0" y="0"/>
+          <a:ext cx="0" cy="0"/>
+          <a:chOff x="0" y="0"/>
+          <a:chExt cx="0" cy="0"/>
+        </a:xfrm>
+      </p:grpSpPr>
+      <p:sp>
+        <p:nvSpPr>
+          <p:cNvPr id="2" name="Заголовок 1">
+            <a:extLst>
+              <a:ext uri="{FF2B5EF4-FFF2-40B4-BE49-F238E27FC236}">
+                <a16:creationId xmlns:a16="http://schemas.microsoft.com/office/drawing/2014/main" id="{E431647B-1545-1ED1-B65A-08493DFFE884}"/>
+              </a:ext>
+            </a:extLst>
+          </p:cNvPr>
+          <p:cNvSpPr>
+            <a:spLocks noGrp="1"/>
+          </p:cNvSpPr>
+          <p:nvPr>
+            <p:ph type="title"/>
+          </p:nvPr>
+        </p:nvSpPr>
+        <p:spPr/>
+        <p:txBody>
+          <a:bodyPr/>
+          <a:lstStyle/>
+          <a:p>
+            <a:r>
+              <a:rPr lang="ru-RU" dirty="0"/>
+              <a:t>Форма для редактирования</a:t>
+            </a:r>
+          </a:p>
+        </p:txBody>
+      </p:sp>
+      <p:sp>
+        <p:nvSpPr>
+          <p:cNvPr id="3" name="Объект 2">
+            <a:extLst>
+              <a:ext uri="{FF2B5EF4-FFF2-40B4-BE49-F238E27FC236}">
+                <a16:creationId xmlns:a16="http://schemas.microsoft.com/office/drawing/2014/main" id="{DD964D9D-4EB5-C36E-A23A-7610E4B749F8}"/>
+              </a:ext>
+            </a:extLst>
+          </p:cNvPr>
+          <p:cNvSpPr>
+            <a:spLocks noGrp="1"/>
+          </p:cNvSpPr>
+          <p:nvPr>
+            <p:ph idx="1"/>
+          </p:nvPr>
+        </p:nvSpPr>
+        <p:spPr/>
+        <p:txBody>
+          <a:bodyPr/>
+          <a:lstStyle/>
+          <a:p>
+            <a:endParaRPr lang="ru-RU" dirty="0"/>
+          </a:p>
+        </p:txBody>
+      </p:sp>
+      <p:pic>
+        <p:nvPicPr>
+          <p:cNvPr id="7" name="Рисунок 6">
+            <a:extLst>
+              <a:ext uri="{FF2B5EF4-FFF2-40B4-BE49-F238E27FC236}">
+                <a16:creationId xmlns:a16="http://schemas.microsoft.com/office/drawing/2014/main" id="{C9EB368C-6C21-FA80-A072-8B0FBC37B382}"/>
+              </a:ext>
+            </a:extLst>
+          </p:cNvPr>
+          <p:cNvPicPr>
+            <a:picLocks noChangeAspect="1"/>
+          </p:cNvPicPr>
+          <p:nvPr/>
+        </p:nvPicPr>
+        <p:blipFill>
+          <a:blip r:embed="rId2"/>
+          <a:stretch>
+            <a:fillRect/>
+          </a:stretch>
+        </p:blipFill>
+        <p:spPr>
+          <a:xfrm>
+            <a:off x="2175845" y="1589163"/>
+            <a:ext cx="7840309" cy="4568847"/>
+          </a:xfrm>
+          <a:prstGeom prst="rect">
+            <a:avLst/>
+          </a:prstGeom>
+        </p:spPr>
+      </p:pic>
+    </p:spTree>
+    <p:extLst>
+      <p:ext uri="{BB962C8B-B14F-4D97-AF65-F5344CB8AC3E}">
+        <p14:creationId xmlns:p14="http://schemas.microsoft.com/office/powerpoint/2010/main" val="3302363709"/>
+      </p:ext>
+    </p:extLst>
+  </p:cSld>
+  <p:clrMapOvr>
+    <a:masterClrMapping/>
+  </p:clrMapOvr>
+</p:sld>
+</file>
+
+<file path=ppt/slides/slide9.xml><?xml version="1.0" encoding="utf-8"?>
 <p:sld xmlns:a="http://schemas.openxmlformats.org/drawingml/2006/main" xmlns:r="http://schemas.openxmlformats.org/officeDocument/2006/relationships" xmlns:p="http://schemas.openxmlformats.org/presentationml/2006/main">
   <p:cSld>
     <p:spTree>

</xml_diff>